<commit_message>
update presentation and add some docs
</commit_message>
<xml_diff>
--- a/docs/Проект.pptx
+++ b/docs/Проект.pptx
@@ -330,7 +330,7 @@
           <a:p>
             <a:fld id="{EC6EA1C4-5DA3-4B6D-845E-7DAE63B469D2}" type="datetimeFigureOut">
               <a:rPr lang="bg-BG" smtClean="0"/>
-              <a:t>17.12.2022 г.</a:t>
+              <a:t>19.12.2022 г.</a:t>
             </a:fld>
             <a:endParaRPr lang="bg-BG"/>
           </a:p>
@@ -520,7 +520,7 @@
           <a:p>
             <a:fld id="{EC6EA1C4-5DA3-4B6D-845E-7DAE63B469D2}" type="datetimeFigureOut">
               <a:rPr lang="bg-BG" smtClean="0"/>
-              <a:t>17.12.2022 г.</a:t>
+              <a:t>19.12.2022 г.</a:t>
             </a:fld>
             <a:endParaRPr lang="bg-BG"/>
           </a:p>
@@ -700,7 +700,7 @@
           <a:p>
             <a:fld id="{EC6EA1C4-5DA3-4B6D-845E-7DAE63B469D2}" type="datetimeFigureOut">
               <a:rPr lang="bg-BG" smtClean="0"/>
-              <a:t>17.12.2022 г.</a:t>
+              <a:t>19.12.2022 г.</a:t>
             </a:fld>
             <a:endParaRPr lang="bg-BG"/>
           </a:p>
@@ -870,7 +870,7 @@
           <a:p>
             <a:fld id="{EC6EA1C4-5DA3-4B6D-845E-7DAE63B469D2}" type="datetimeFigureOut">
               <a:rPr lang="bg-BG" smtClean="0"/>
-              <a:t>17.12.2022 г.</a:t>
+              <a:t>19.12.2022 г.</a:t>
             </a:fld>
             <a:endParaRPr lang="bg-BG"/>
           </a:p>
@@ -1126,7 +1126,7 @@
           <a:p>
             <a:fld id="{EC6EA1C4-5DA3-4B6D-845E-7DAE63B469D2}" type="datetimeFigureOut">
               <a:rPr lang="bg-BG" smtClean="0"/>
-              <a:t>17.12.2022 г.</a:t>
+              <a:t>19.12.2022 г.</a:t>
             </a:fld>
             <a:endParaRPr lang="bg-BG"/>
           </a:p>
@@ -1414,7 +1414,7 @@
           <a:p>
             <a:fld id="{EC6EA1C4-5DA3-4B6D-845E-7DAE63B469D2}" type="datetimeFigureOut">
               <a:rPr lang="bg-BG" smtClean="0"/>
-              <a:t>17.12.2022 г.</a:t>
+              <a:t>19.12.2022 г.</a:t>
             </a:fld>
             <a:endParaRPr lang="bg-BG"/>
           </a:p>
@@ -1852,7 +1852,7 @@
           <a:p>
             <a:fld id="{EC6EA1C4-5DA3-4B6D-845E-7DAE63B469D2}" type="datetimeFigureOut">
               <a:rPr lang="bg-BG" smtClean="0"/>
-              <a:t>17.12.2022 г.</a:t>
+              <a:t>19.12.2022 г.</a:t>
             </a:fld>
             <a:endParaRPr lang="bg-BG"/>
           </a:p>
@@ -1970,7 +1970,7 @@
           <a:p>
             <a:fld id="{EC6EA1C4-5DA3-4B6D-845E-7DAE63B469D2}" type="datetimeFigureOut">
               <a:rPr lang="bg-BG" smtClean="0"/>
-              <a:t>17.12.2022 г.</a:t>
+              <a:t>19.12.2022 г.</a:t>
             </a:fld>
             <a:endParaRPr lang="bg-BG"/>
           </a:p>
@@ -2065,7 +2065,7 @@
           <a:p>
             <a:fld id="{EC6EA1C4-5DA3-4B6D-845E-7DAE63B469D2}" type="datetimeFigureOut">
               <a:rPr lang="bg-BG" smtClean="0"/>
-              <a:t>17.12.2022 г.</a:t>
+              <a:t>19.12.2022 г.</a:t>
             </a:fld>
             <a:endParaRPr lang="bg-BG"/>
           </a:p>
@@ -2421,7 +2421,7 @@
           <a:p>
             <a:fld id="{EC6EA1C4-5DA3-4B6D-845E-7DAE63B469D2}" type="datetimeFigureOut">
               <a:rPr lang="bg-BG" smtClean="0"/>
-              <a:t>17.12.2022 г.</a:t>
+              <a:t>19.12.2022 г.</a:t>
             </a:fld>
             <a:endParaRPr lang="bg-BG"/>
           </a:p>
@@ -2737,7 +2737,7 @@
           <a:p>
             <a:fld id="{EC6EA1C4-5DA3-4B6D-845E-7DAE63B469D2}" type="datetimeFigureOut">
               <a:rPr lang="bg-BG" smtClean="0"/>
-              <a:t>17.12.2022 г.</a:t>
+              <a:t>19.12.2022 г.</a:t>
             </a:fld>
             <a:endParaRPr lang="bg-BG"/>
           </a:p>
@@ -2970,7 +2970,7 @@
           <a:p>
             <a:fld id="{EC6EA1C4-5DA3-4B6D-845E-7DAE63B469D2}" type="datetimeFigureOut">
               <a:rPr lang="bg-BG" smtClean="0"/>
-              <a:t>17.12.2022 г.</a:t>
+              <a:t>19.12.2022 г.</a:t>
             </a:fld>
             <a:endParaRPr lang="bg-BG"/>
           </a:p>
@@ -3748,7 +3748,7 @@
             </a:r>
             <a:r>
               <a:rPr lang="bg-BG" dirty="0"/>
-              <a:t>български и чуждестранни филми</a:t>
+              <a:t>филми</a:t>
             </a:r>
             <a:endParaRPr lang="en-US" dirty="0"/>
           </a:p>
@@ -3819,8 +3819,13 @@
           <a:p>
             <a:r>
               <a:rPr lang="bg-BG" dirty="0"/>
-              <a:t>Подходи за реализация</a:t>
-            </a:r>
+              <a:t>Начини </a:t>
+            </a:r>
+            <a:r>
+              <a:rPr lang="bg-BG"/>
+              <a:t>за реализация</a:t>
+            </a:r>
+            <a:endParaRPr lang="bg-BG" dirty="0"/>
           </a:p>
         </p:txBody>
       </p:sp>
@@ -3907,7 +3912,6 @@
               <a:rPr lang="bg-BG" dirty="0"/>
               <a:t>Индексация и търсене</a:t>
             </a:r>
-            <a:endParaRPr lang="en-US" dirty="0"/>
           </a:p>
         </p:txBody>
       </p:sp>
@@ -4149,6 +4153,33 @@
             </a:r>
           </a:p>
           <a:p>
+            <a:r>
+              <a:rPr lang="en-US" dirty="0"/>
+              <a:t>Flask </a:t>
+            </a:r>
+            <a:r>
+              <a:rPr lang="bg-BG" dirty="0"/>
+              <a:t>за </a:t>
+            </a:r>
+            <a:r>
+              <a:rPr lang="en-US" dirty="0"/>
+              <a:t>web </a:t>
+            </a:r>
+            <a:r>
+              <a:rPr lang="bg-BG" dirty="0"/>
+              <a:t>(</a:t>
+            </a:r>
+            <a:r>
+              <a:rPr lang="en-US" dirty="0"/>
+              <a:t>back-end) </a:t>
+            </a:r>
+            <a:r>
+              <a:rPr lang="bg-BG" dirty="0"/>
+              <a:t>част</a:t>
+            </a:r>
+            <a:endParaRPr lang="en-US" dirty="0"/>
+          </a:p>
+          <a:p>
             <a:pPr marL="0" indent="0">
               <a:buNone/>
             </a:pPr>
@@ -4454,8 +4485,13 @@
           <a:p>
             <a:r>
               <a:rPr lang="bg-BG" dirty="0"/>
-              <a:t>Уеб базирана търсачка</a:t>
-            </a:r>
+              <a:t>Уеб </a:t>
+            </a:r>
+            <a:r>
+              <a:rPr lang="bg-BG"/>
+              <a:t>базирана търсачка</a:t>
+            </a:r>
+            <a:endParaRPr lang="bg-BG" dirty="0"/>
           </a:p>
         </p:txBody>
       </p:sp>

</xml_diff>